<commit_message>
Finished 1st version of the presentation
</commit_message>
<xml_diff>
--- a/Presentation.pptx
+++ b/Presentation.pptx
@@ -5,22 +5,20 @@
     <p:sldMasterId id="2147483648" r:id="rId4"/>
   </p:sldMasterIdLst>
   <p:notesMasterIdLst>
-    <p:notesMasterId r:id="rId15"/>
+    <p:notesMasterId r:id="rId13"/>
   </p:notesMasterIdLst>
   <p:handoutMasterIdLst>
-    <p:handoutMasterId r:id="rId16"/>
+    <p:handoutMasterId r:id="rId14"/>
   </p:handoutMasterIdLst>
   <p:sldIdLst>
     <p:sldId id="256" r:id="rId5"/>
     <p:sldId id="265" r:id="rId6"/>
     <p:sldId id="266" r:id="rId7"/>
-    <p:sldId id="267" r:id="rId8"/>
-    <p:sldId id="269" r:id="rId9"/>
-    <p:sldId id="270" r:id="rId10"/>
-    <p:sldId id="271" r:id="rId11"/>
-    <p:sldId id="272" r:id="rId12"/>
-    <p:sldId id="274" r:id="rId13"/>
-    <p:sldId id="275" r:id="rId14"/>
+    <p:sldId id="276" r:id="rId8"/>
+    <p:sldId id="267" r:id="rId9"/>
+    <p:sldId id="277" r:id="rId10"/>
+    <p:sldId id="269" r:id="rId11"/>
+    <p:sldId id="278" r:id="rId12"/>
   </p:sldIdLst>
   <p:sldSz cx="12192000" cy="6858000"/>
   <p:notesSz cx="6858000" cy="9144000"/>
@@ -663,91 +661,6 @@
     </a:lvl9pPr>
   </p:notesStyle>
 </p:notesMaster>
-</file>
-
-<file path=ppt/notesSlides/notesSlide1.xml><?xml version="1.0" encoding="utf-8"?>
-<p:notes xmlns:a="http://schemas.openxmlformats.org/drawingml/2006/main" xmlns:r="http://schemas.openxmlformats.org/officeDocument/2006/relationships" xmlns:p="http://schemas.openxmlformats.org/presentationml/2006/main">
-  <p:cSld>
-    <p:spTree>
-      <p:nvGrpSpPr>
-        <p:cNvPr id="1" name=""/>
-        <p:cNvGrpSpPr/>
-        <p:nvPr/>
-      </p:nvGrpSpPr>
-      <p:grpSpPr>
-        <a:xfrm>
-          <a:off x="0" y="0"/>
-          <a:ext cx="0" cy="0"/>
-          <a:chOff x="0" y="0"/>
-          <a:chExt cx="0" cy="0"/>
-        </a:xfrm>
-      </p:grpSpPr>
-      <p:sp>
-        <p:nvSpPr>
-          <p:cNvPr id="2" name="Espace réservé de l'image des diapositives 1"/>
-          <p:cNvSpPr>
-            <a:spLocks noGrp="1" noRot="1" noChangeAspect="1"/>
-          </p:cNvSpPr>
-          <p:nvPr>
-            <p:ph type="sldImg"/>
-          </p:nvPr>
-        </p:nvSpPr>
-        <p:spPr/>
-      </p:sp>
-      <p:sp>
-        <p:nvSpPr>
-          <p:cNvPr id="3" name="Espace réservé des notes 2"/>
-          <p:cNvSpPr>
-            <a:spLocks noGrp="1"/>
-          </p:cNvSpPr>
-          <p:nvPr>
-            <p:ph type="body" idx="1"/>
-          </p:nvPr>
-        </p:nvSpPr>
-        <p:spPr/>
-        <p:txBody>
-          <a:bodyPr/>
-          <a:lstStyle/>
-          <a:p>
-            <a:endParaRPr lang="fr-FR"/>
-          </a:p>
-        </p:txBody>
-      </p:sp>
-      <p:sp>
-        <p:nvSpPr>
-          <p:cNvPr id="4" name="Espace réservé du numéro de diapositive 3"/>
-          <p:cNvSpPr>
-            <a:spLocks noGrp="1"/>
-          </p:cNvSpPr>
-          <p:nvPr>
-            <p:ph type="sldNum" sz="quarter" idx="10"/>
-          </p:nvPr>
-        </p:nvSpPr>
-        <p:spPr/>
-        <p:txBody>
-          <a:bodyPr/>
-          <a:lstStyle/>
-          <a:p>
-            <a:fld id="{5EE2CF44-2B13-41B4-A334-1CDF534EEBBF}" type="slidenum">
-              <a:rPr lang="fr-FR" smtClean="0"/>
-              <a:pPr/>
-              <a:t>10</a:t>
-            </a:fld>
-            <a:endParaRPr lang="fr-FR" dirty="0"/>
-          </a:p>
-        </p:txBody>
-      </p:sp>
-    </p:spTree>
-    <p:extLst>
-      <p:ext uri="{BB962C8B-B14F-4D97-AF65-F5344CB8AC3E}">
-        <p14:creationId xmlns:p14="http://schemas.microsoft.com/office/powerpoint/2010/main" val="3459061200"/>
-      </p:ext>
-    </p:extLst>
-  </p:cSld>
-  <p:clrMapOvr>
-    <a:masterClrMapping/>
-  </p:clrMapOvr>
-</p:notes>
 </file>
 
 <file path=ppt/slideLayouts/slideLayout1.xml><?xml version="1.0" encoding="utf-8"?>
@@ -3979,9 +3892,21 @@
         </p:nvSpPr>
         <p:spPr/>
         <p:txBody>
-          <a:bodyPr rtlCol="0"/>
+          <a:bodyPr rtlCol="0">
+            <a:normAutofit/>
+          </a:bodyPr>
           <a:lstStyle/>
           <a:p>
+            <a:r>
+              <a:rPr lang="en-US" dirty="0"/>
+              <a:t>Team: Int1-8</a:t>
+            </a:r>
+          </a:p>
+          <a:p>
+            <a:r>
+              <a:rPr lang="en-US" dirty="0"/>
+              <a:t>Names: </a:t>
+            </a:r>
             <a:r>
               <a:rPr lang="en-US" dirty="0" err="1"/>
               <a:t>Kiesgen</a:t>
@@ -4003,12 +3928,6 @@
               <a:t>Vaio</a:t>
             </a:r>
             <a:endParaRPr lang="en-US" dirty="0"/>
-          </a:p>
-          <a:p>
-            <a:r>
-              <a:rPr lang="en-US" dirty="0"/>
-              <a:t>Team: Int1-8</a:t>
-            </a:r>
           </a:p>
         </p:txBody>
       </p:sp>
@@ -4034,88 +3953,6 @@
       </p:transition>
     </mc:Fallback>
   </mc:AlternateContent>
-</p:sld>
-</file>
-
-<file path=ppt/slides/slide10.xml><?xml version="1.0" encoding="utf-8"?>
-<p:sld xmlns:a="http://schemas.openxmlformats.org/drawingml/2006/main" xmlns:r="http://schemas.openxmlformats.org/officeDocument/2006/relationships" xmlns:p="http://schemas.openxmlformats.org/presentationml/2006/main">
-  <p:cSld>
-    <p:spTree>
-      <p:nvGrpSpPr>
-        <p:cNvPr id="1" name=""/>
-        <p:cNvGrpSpPr/>
-        <p:nvPr/>
-      </p:nvGrpSpPr>
-      <p:grpSpPr>
-        <a:xfrm>
-          <a:off x="0" y="0"/>
-          <a:ext cx="0" cy="0"/>
-          <a:chOff x="0" y="0"/>
-          <a:chExt cx="0" cy="0"/>
-        </a:xfrm>
-      </p:grpSpPr>
-      <p:sp>
-        <p:nvSpPr>
-          <p:cNvPr id="2" name="Titre 1"/>
-          <p:cNvSpPr>
-            <a:spLocks noGrp="1"/>
-          </p:cNvSpPr>
-          <p:nvPr>
-            <p:ph type="title"/>
-          </p:nvPr>
-        </p:nvSpPr>
-        <p:spPr/>
-        <p:txBody>
-          <a:bodyPr rtlCol="0"/>
-          <a:lstStyle/>
-          <a:p>
-            <a:pPr rtl="0"/>
-            <a:endParaRPr lang="fr-FR" dirty="0"/>
-          </a:p>
-        </p:txBody>
-      </p:sp>
-      <p:sp>
-        <p:nvSpPr>
-          <p:cNvPr id="3" name="Espace réservé d’image 2"/>
-          <p:cNvSpPr>
-            <a:spLocks noGrp="1"/>
-          </p:cNvSpPr>
-          <p:nvPr>
-            <p:ph type="pic" idx="1"/>
-          </p:nvPr>
-        </p:nvSpPr>
-        <p:spPr/>
-      </p:sp>
-      <p:sp>
-        <p:nvSpPr>
-          <p:cNvPr id="4" name="Espace réservé du texte 3"/>
-          <p:cNvSpPr>
-            <a:spLocks noGrp="1"/>
-          </p:cNvSpPr>
-          <p:nvPr>
-            <p:ph type="body" sz="half" idx="2"/>
-          </p:nvPr>
-        </p:nvSpPr>
-        <p:spPr/>
-        <p:txBody>
-          <a:bodyPr rtlCol="0"/>
-          <a:lstStyle/>
-          <a:p>
-            <a:pPr rtl="0"/>
-            <a:endParaRPr lang="fr-FR" dirty="0"/>
-          </a:p>
-        </p:txBody>
-      </p:sp>
-    </p:spTree>
-    <p:extLst>
-      <p:ext uri="{BB962C8B-B14F-4D97-AF65-F5344CB8AC3E}">
-        <p14:creationId xmlns:p14="http://schemas.microsoft.com/office/powerpoint/2010/main" val="1857640680"/>
-      </p:ext>
-    </p:extLst>
-  </p:cSld>
-  <p:clrMapOvr>
-    <a:masterClrMapping/>
-  </p:clrMapOvr>
 </p:sld>
 </file>
 
@@ -4183,11 +4020,19 @@
             <a:pPr rtl="0"/>
             <a:r>
               <a:rPr lang="fr-FR" dirty="0"/>
-              <a:t>Data structures and </a:t>
+              <a:t>Data structures, </a:t>
             </a:r>
             <a:r>
               <a:rPr lang="fr-FR" dirty="0" err="1"/>
               <a:t>reading</a:t>
+            </a:r>
+            <a:r>
+              <a:rPr lang="fr-FR" dirty="0"/>
+              <a:t> and </a:t>
+            </a:r>
+            <a:r>
+              <a:rPr lang="fr-FR" dirty="0" err="1"/>
+              <a:t>displaying</a:t>
             </a:r>
             <a:endParaRPr lang="fr-FR" dirty="0"/>
           </a:p>
@@ -5555,6 +5400,517 @@
 </file>
 
 <file path=ppt/slides/slide4.xml><?xml version="1.0" encoding="utf-8"?>
+<p:sld xmlns:a="http://schemas.openxmlformats.org/drawingml/2006/main" xmlns:r="http://schemas.openxmlformats.org/officeDocument/2006/relationships" xmlns:p="http://schemas.openxmlformats.org/presentationml/2006/main">
+  <p:cSld>
+    <p:spTree>
+      <p:nvGrpSpPr>
+        <p:cNvPr id="1" name=""/>
+        <p:cNvGrpSpPr/>
+        <p:nvPr/>
+      </p:nvGrpSpPr>
+      <p:grpSpPr>
+        <a:xfrm>
+          <a:off x="0" y="0"/>
+          <a:ext cx="0" cy="0"/>
+          <a:chOff x="0" y="0"/>
+          <a:chExt cx="0" cy="0"/>
+        </a:xfrm>
+      </p:grpSpPr>
+      <p:sp>
+        <p:nvSpPr>
+          <p:cNvPr id="2" name="Titre 1">
+            <a:extLst>
+              <a:ext uri="{FF2B5EF4-FFF2-40B4-BE49-F238E27FC236}">
+                <a16:creationId xmlns:a16="http://schemas.microsoft.com/office/drawing/2014/main" id="{61F8A613-1D45-415F-8D29-817557064024}"/>
+              </a:ext>
+            </a:extLst>
+          </p:cNvPr>
+          <p:cNvSpPr>
+            <a:spLocks noGrp="1"/>
+          </p:cNvSpPr>
+          <p:nvPr>
+            <p:ph type="title"/>
+          </p:nvPr>
+        </p:nvSpPr>
+        <p:spPr/>
+        <p:txBody>
+          <a:bodyPr/>
+          <a:lstStyle/>
+          <a:p>
+            <a:r>
+              <a:rPr lang="fr-FR" dirty="0"/>
+              <a:t>Reading and </a:t>
+            </a:r>
+            <a:r>
+              <a:rPr lang="fr-FR" dirty="0" err="1"/>
+              <a:t>displaying</a:t>
+            </a:r>
+            <a:endParaRPr lang="fr-FR" dirty="0"/>
+          </a:p>
+        </p:txBody>
+      </p:sp>
+      <p:pic>
+        <p:nvPicPr>
+          <p:cNvPr id="4" name="Image 3">
+            <a:extLst>
+              <a:ext uri="{FF2B5EF4-FFF2-40B4-BE49-F238E27FC236}">
+                <a16:creationId xmlns:a16="http://schemas.microsoft.com/office/drawing/2014/main" id="{3E555792-23F3-4AFC-BC31-E93BB5C73454}"/>
+              </a:ext>
+            </a:extLst>
+          </p:cNvPr>
+          <p:cNvPicPr>
+            <a:picLocks noChangeAspect="1"/>
+          </p:cNvPicPr>
+          <p:nvPr/>
+        </p:nvPicPr>
+        <p:blipFill>
+          <a:blip r:embed="rId2"/>
+          <a:stretch>
+            <a:fillRect/>
+          </a:stretch>
+        </p:blipFill>
+        <p:spPr>
+          <a:xfrm>
+            <a:off x="513910" y="2164233"/>
+            <a:ext cx="4515452" cy="3305188"/>
+          </a:xfrm>
+          <a:prstGeom prst="rect">
+            <a:avLst/>
+          </a:prstGeom>
+        </p:spPr>
+      </p:pic>
+      <p:pic>
+        <p:nvPicPr>
+          <p:cNvPr id="5" name="Image 4">
+            <a:extLst>
+              <a:ext uri="{FF2B5EF4-FFF2-40B4-BE49-F238E27FC236}">
+                <a16:creationId xmlns:a16="http://schemas.microsoft.com/office/drawing/2014/main" id="{A9E84CA0-7247-48B5-9812-1F39027CD6A4}"/>
+              </a:ext>
+            </a:extLst>
+          </p:cNvPr>
+          <p:cNvPicPr>
+            <a:picLocks noChangeAspect="1"/>
+          </p:cNvPicPr>
+          <p:nvPr/>
+        </p:nvPicPr>
+        <p:blipFill>
+          <a:blip r:embed="rId3"/>
+          <a:stretch>
+            <a:fillRect/>
+          </a:stretch>
+        </p:blipFill>
+        <p:spPr>
+          <a:xfrm>
+            <a:off x="6834970" y="1712615"/>
+            <a:ext cx="4843120" cy="2160240"/>
+          </a:xfrm>
+          <a:prstGeom prst="rect">
+            <a:avLst/>
+          </a:prstGeom>
+        </p:spPr>
+      </p:pic>
+      <p:pic>
+        <p:nvPicPr>
+          <p:cNvPr id="6" name="Image 5">
+            <a:extLst>
+              <a:ext uri="{FF2B5EF4-FFF2-40B4-BE49-F238E27FC236}">
+                <a16:creationId xmlns:a16="http://schemas.microsoft.com/office/drawing/2014/main" id="{5019874F-1FF9-42C9-AE4A-35CEE7F4AB36}"/>
+              </a:ext>
+            </a:extLst>
+          </p:cNvPr>
+          <p:cNvPicPr>
+            <a:picLocks noChangeAspect="1"/>
+          </p:cNvPicPr>
+          <p:nvPr/>
+        </p:nvPicPr>
+        <p:blipFill>
+          <a:blip r:embed="rId4"/>
+          <a:stretch>
+            <a:fillRect/>
+          </a:stretch>
+        </p:blipFill>
+        <p:spPr>
+          <a:xfrm>
+            <a:off x="5837904" y="4194612"/>
+            <a:ext cx="516191" cy="2206188"/>
+          </a:xfrm>
+          <a:prstGeom prst="rect">
+            <a:avLst/>
+          </a:prstGeom>
+        </p:spPr>
+      </p:pic>
+      <p:graphicFrame>
+        <p:nvGraphicFramePr>
+          <p:cNvPr id="7" name="Tableau 6">
+            <a:extLst>
+              <a:ext uri="{FF2B5EF4-FFF2-40B4-BE49-F238E27FC236}">
+                <a16:creationId xmlns:a16="http://schemas.microsoft.com/office/drawing/2014/main" id="{AEC0A171-24B8-4F35-8476-93352C920243}"/>
+              </a:ext>
+            </a:extLst>
+          </p:cNvPr>
+          <p:cNvGraphicFramePr>
+            <a:graphicFrameLocks noGrp="1"/>
+          </p:cNvGraphicFramePr>
+          <p:nvPr>
+            <p:extLst>
+              <p:ext uri="{D42A27DB-BD31-4B8C-83A1-F6EECF244321}">
+                <p14:modId xmlns:p14="http://schemas.microsoft.com/office/powerpoint/2010/main" val="972165476"/>
+              </p:ext>
+            </p:extLst>
+          </p:nvPr>
+        </p:nvGraphicFramePr>
+        <p:xfrm>
+          <a:off x="8400256" y="4082209"/>
+          <a:ext cx="2440959" cy="1478280"/>
+        </p:xfrm>
+        <a:graphic>
+          <a:graphicData uri="http://schemas.openxmlformats.org/drawingml/2006/table">
+            <a:tbl>
+              <a:tblPr firstRow="1" firstCol="1" bandRow="1">
+                <a:tableStyleId>{5C22544A-7EE6-4342-B048-85BDC9FD1C3A}</a:tableStyleId>
+              </a:tblPr>
+              <a:tblGrid>
+                <a:gridCol w="813653">
+                  <a:extLst>
+                    <a:ext uri="{9D8B030D-6E8A-4147-A177-3AD203B41FA5}">
+                      <a16:colId xmlns:a16="http://schemas.microsoft.com/office/drawing/2014/main" val="1924676122"/>
+                    </a:ext>
+                  </a:extLst>
+                </a:gridCol>
+                <a:gridCol w="813653">
+                  <a:extLst>
+                    <a:ext uri="{9D8B030D-6E8A-4147-A177-3AD203B41FA5}">
+                      <a16:colId xmlns:a16="http://schemas.microsoft.com/office/drawing/2014/main" val="4115003734"/>
+                    </a:ext>
+                  </a:extLst>
+                </a:gridCol>
+                <a:gridCol w="813653">
+                  <a:extLst>
+                    <a:ext uri="{9D8B030D-6E8A-4147-A177-3AD203B41FA5}">
+                      <a16:colId xmlns:a16="http://schemas.microsoft.com/office/drawing/2014/main" val="2380286523"/>
+                    </a:ext>
+                  </a:extLst>
+                </a:gridCol>
+              </a:tblGrid>
+              <a:tr h="0">
+                <a:tc>
+                  <a:txBody>
+                    <a:bodyPr/>
+                    <a:lstStyle/>
+                    <a:p>
+                      <a:r>
+                        <a:rPr lang="fr-FR" dirty="0"/>
+                        <a:t>[0]</a:t>
+                      </a:r>
+                    </a:p>
+                  </a:txBody>
+                  <a:tcPr/>
+                </a:tc>
+                <a:tc>
+                  <a:txBody>
+                    <a:bodyPr/>
+                    <a:lstStyle/>
+                    <a:p>
+                      <a:r>
+                        <a:rPr lang="fr-FR" dirty="0"/>
+                        <a:t>[a]</a:t>
+                      </a:r>
+                    </a:p>
+                  </a:txBody>
+                  <a:tcPr/>
+                </a:tc>
+                <a:tc>
+                  <a:txBody>
+                    <a:bodyPr/>
+                    <a:lstStyle/>
+                    <a:p>
+                      <a:r>
+                        <a:rPr lang="fr-FR" dirty="0"/>
+                        <a:t>[b]</a:t>
+                      </a:r>
+                    </a:p>
+                  </a:txBody>
+                  <a:tcPr/>
+                </a:tc>
+                <a:extLst>
+                  <a:ext uri="{0D108BD9-81ED-4DB2-BD59-A6C34878D82A}">
+                    <a16:rowId xmlns:a16="http://schemas.microsoft.com/office/drawing/2014/main" val="3778072159"/>
+                  </a:ext>
+                </a:extLst>
+              </a:tr>
+              <a:tr h="370840">
+                <a:tc>
+                  <a:txBody>
+                    <a:bodyPr/>
+                    <a:lstStyle/>
+                    <a:p>
+                      <a:r>
+                        <a:rPr lang="fr-FR" dirty="0"/>
+                        <a:t>[1,0]</a:t>
+                      </a:r>
+                    </a:p>
+                  </a:txBody>
+                  <a:tcPr/>
+                </a:tc>
+                <a:tc>
+                  <a:txBody>
+                    <a:bodyPr/>
+                    <a:lstStyle/>
+                    <a:p>
+                      <a:r>
+                        <a:rPr lang="fr-FR" dirty="0"/>
+                        <a:t>[1,1]</a:t>
+                      </a:r>
+                    </a:p>
+                  </a:txBody>
+                  <a:tcPr/>
+                </a:tc>
+                <a:tc>
+                  <a:txBody>
+                    <a:bodyPr/>
+                    <a:lstStyle/>
+                    <a:p>
+                      <a:r>
+                        <a:rPr lang="fr-FR" dirty="0"/>
+                        <a:t>[2,1,2]</a:t>
+                      </a:r>
+                    </a:p>
+                  </a:txBody>
+                  <a:tcPr/>
+                </a:tc>
+                <a:extLst>
+                  <a:ext uri="{0D108BD9-81ED-4DB2-BD59-A6C34878D82A}">
+                    <a16:rowId xmlns:a16="http://schemas.microsoft.com/office/drawing/2014/main" val="2682948552"/>
+                  </a:ext>
+                </a:extLst>
+              </a:tr>
+              <a:tr h="370840">
+                <a:tc>
+                  <a:txBody>
+                    <a:bodyPr/>
+                    <a:lstStyle/>
+                    <a:p>
+                      <a:r>
+                        <a:rPr lang="fr-FR" dirty="0"/>
+                        <a:t>[1,1]</a:t>
+                      </a:r>
+                    </a:p>
+                  </a:txBody>
+                  <a:tcPr/>
+                </a:tc>
+                <a:tc>
+                  <a:txBody>
+                    <a:bodyPr/>
+                    <a:lstStyle/>
+                    <a:p>
+                      <a:r>
+                        <a:rPr lang="fr-FR" dirty="0"/>
+                        <a:t>[0]</a:t>
+                      </a:r>
+                    </a:p>
+                  </a:txBody>
+                  <a:tcPr/>
+                </a:tc>
+                <a:tc>
+                  <a:txBody>
+                    <a:bodyPr/>
+                    <a:lstStyle/>
+                    <a:p>
+                      <a:r>
+                        <a:rPr lang="fr-FR" dirty="0"/>
+                        <a:t>[2,0,2]</a:t>
+                      </a:r>
+                    </a:p>
+                  </a:txBody>
+                  <a:tcPr/>
+                </a:tc>
+                <a:extLst>
+                  <a:ext uri="{0D108BD9-81ED-4DB2-BD59-A6C34878D82A}">
+                    <a16:rowId xmlns:a16="http://schemas.microsoft.com/office/drawing/2014/main" val="2949040926"/>
+                  </a:ext>
+                </a:extLst>
+              </a:tr>
+              <a:tr h="370840">
+                <a:tc>
+                  <a:txBody>
+                    <a:bodyPr/>
+                    <a:lstStyle/>
+                    <a:p>
+                      <a:r>
+                        <a:rPr lang="fr-FR" dirty="0"/>
+                        <a:t>[1,2]</a:t>
+                      </a:r>
+                    </a:p>
+                  </a:txBody>
+                  <a:tcPr/>
+                </a:tc>
+                <a:tc>
+                  <a:txBody>
+                    <a:bodyPr/>
+                    <a:lstStyle/>
+                    <a:p>
+                      <a:r>
+                        <a:rPr lang="fr-FR" dirty="0"/>
+                        <a:t>[2,0,1]</a:t>
+                      </a:r>
+                    </a:p>
+                  </a:txBody>
+                  <a:tcPr/>
+                </a:tc>
+                <a:tc>
+                  <a:txBody>
+                    <a:bodyPr/>
+                    <a:lstStyle/>
+                    <a:p>
+                      <a:r>
+                        <a:rPr lang="fr-FR" dirty="0"/>
+                        <a:t>[0]</a:t>
+                      </a:r>
+                    </a:p>
+                  </a:txBody>
+                  <a:tcPr/>
+                </a:tc>
+                <a:extLst>
+                  <a:ext uri="{0D108BD9-81ED-4DB2-BD59-A6C34878D82A}">
+                    <a16:rowId xmlns:a16="http://schemas.microsoft.com/office/drawing/2014/main" val="693849637"/>
+                  </a:ext>
+                </a:extLst>
+              </a:tr>
+            </a:tbl>
+          </a:graphicData>
+        </a:graphic>
+      </p:graphicFrame>
+      <p:sp>
+        <p:nvSpPr>
+          <p:cNvPr id="8" name="Flèche : droite 7">
+            <a:extLst>
+              <a:ext uri="{FF2B5EF4-FFF2-40B4-BE49-F238E27FC236}">
+                <a16:creationId xmlns:a16="http://schemas.microsoft.com/office/drawing/2014/main" id="{9BDA9B7D-1FB7-4A90-937A-C0D4CBBACED0}"/>
+              </a:ext>
+            </a:extLst>
+          </p:cNvPr>
+          <p:cNvSpPr/>
+          <p:nvPr/>
+        </p:nvSpPr>
+        <p:spPr>
+          <a:xfrm>
+            <a:off x="6675990" y="4821349"/>
+            <a:ext cx="1207288" cy="648072"/>
+          </a:xfrm>
+          <a:prstGeom prst="rightArrow">
+            <a:avLst/>
+          </a:prstGeom>
+        </p:spPr>
+        <p:style>
+          <a:lnRef idx="2">
+            <a:schemeClr val="accent1">
+              <a:shade val="50000"/>
+            </a:schemeClr>
+          </a:lnRef>
+          <a:fillRef idx="1">
+            <a:schemeClr val="accent1"/>
+          </a:fillRef>
+          <a:effectRef idx="0">
+            <a:schemeClr val="accent1"/>
+          </a:effectRef>
+          <a:fontRef idx="minor">
+            <a:schemeClr val="lt1"/>
+          </a:fontRef>
+        </p:style>
+        <p:txBody>
+          <a:bodyPr rtlCol="0" anchor="ctr"/>
+          <a:lstStyle/>
+          <a:p>
+            <a:pPr algn="ctr"/>
+            <a:endParaRPr lang="fr-FR"/>
+          </a:p>
+        </p:txBody>
+      </p:sp>
+      <p:sp>
+        <p:nvSpPr>
+          <p:cNvPr id="9" name="ZoneTexte 8">
+            <a:extLst>
+              <a:ext uri="{FF2B5EF4-FFF2-40B4-BE49-F238E27FC236}">
+                <a16:creationId xmlns:a16="http://schemas.microsoft.com/office/drawing/2014/main" id="{E91CDF31-4784-4373-8029-62CFCD8247D9}"/>
+              </a:ext>
+            </a:extLst>
+          </p:cNvPr>
+          <p:cNvSpPr txBox="1"/>
+          <p:nvPr/>
+        </p:nvSpPr>
+        <p:spPr>
+          <a:xfrm>
+            <a:off x="8184232" y="5756640"/>
+            <a:ext cx="3133818" cy="1000274"/>
+          </a:xfrm>
+          <a:prstGeom prst="rect">
+            <a:avLst/>
+          </a:prstGeom>
+          <a:noFill/>
+        </p:spPr>
+        <p:txBody>
+          <a:bodyPr wrap="square" rtlCol="0">
+            <a:spAutoFit/>
+          </a:bodyPr>
+          <a:lstStyle/>
+          <a:p>
+            <a:pPr>
+              <a:spcBef>
+                <a:spcPts val="600"/>
+              </a:spcBef>
+            </a:pPr>
+            <a:r>
+              <a:rPr lang="en-US" dirty="0" err="1"/>
+              <a:t>nbStates</a:t>
+            </a:r>
+            <a:r>
+              <a:rPr lang="en-US" dirty="0"/>
+              <a:t> = 3        </a:t>
+            </a:r>
+            <a:r>
+              <a:rPr lang="en-US" dirty="0" err="1"/>
+              <a:t>nbAlpha</a:t>
+            </a:r>
+            <a:r>
+              <a:rPr lang="en-US" dirty="0"/>
+              <a:t> = 2</a:t>
+            </a:r>
+          </a:p>
+          <a:p>
+            <a:pPr>
+              <a:spcBef>
+                <a:spcPts val="600"/>
+              </a:spcBef>
+            </a:pPr>
+            <a:r>
+              <a:rPr lang="en-US" dirty="0" err="1"/>
+              <a:t>init</a:t>
+            </a:r>
+            <a:r>
+              <a:rPr lang="en-US" dirty="0"/>
+              <a:t> = [2,1,3]          term = [2,2,3]</a:t>
+            </a:r>
+            <a:endParaRPr lang="fr-FR" dirty="0"/>
+          </a:p>
+          <a:p>
+            <a:endParaRPr lang="fr-FR" dirty="0"/>
+          </a:p>
+        </p:txBody>
+      </p:sp>
+    </p:spTree>
+    <p:extLst>
+      <p:ext uri="{BB962C8B-B14F-4D97-AF65-F5344CB8AC3E}">
+        <p14:creationId xmlns:p14="http://schemas.microsoft.com/office/powerpoint/2010/main" val="1575268221"/>
+      </p:ext>
+    </p:extLst>
+  </p:cSld>
+  <p:clrMapOvr>
+    <a:masterClrMapping/>
+  </p:clrMapOvr>
+</p:sld>
+</file>
+
+<file path=ppt/slides/slide5.xml><?xml version="1.0" encoding="utf-8"?>
 <p:sld xmlns:a="http://schemas.openxmlformats.org/drawingml/2006/main" xmlns:r="http://schemas.openxmlformats.org/officeDocument/2006/relationships" xmlns:p="http://schemas.openxmlformats.org/presentationml/2006/main">
   <p:cSld>
     <p:spTree>
@@ -6360,10 +6716,10 @@
       </p:sp>
       <p:pic>
         <p:nvPicPr>
-          <p:cNvPr id="4" name="Image 3">
+          <p:cNvPr id="6" name="Image 5">
             <a:extLst>
               <a:ext uri="{FF2B5EF4-FFF2-40B4-BE49-F238E27FC236}">
-                <a16:creationId xmlns:a16="http://schemas.microsoft.com/office/drawing/2014/main" id="{A5C2C840-59FA-43C4-99B2-65B63E4F4B30}"/>
+                <a16:creationId xmlns:a16="http://schemas.microsoft.com/office/drawing/2014/main" id="{14CB790D-DBB1-4ED6-8973-30E5CBA5EB51}"/>
               </a:ext>
             </a:extLst>
           </p:cNvPr>
@@ -6380,8 +6736,38 @@
         </p:blipFill>
         <p:spPr>
           <a:xfrm>
-            <a:off x="420423" y="2276872"/>
-            <a:ext cx="5421887" cy="2836572"/>
+            <a:off x="386081" y="2169730"/>
+            <a:ext cx="5421888" cy="2868895"/>
+          </a:xfrm>
+          <a:prstGeom prst="rect">
+            <a:avLst/>
+          </a:prstGeom>
+        </p:spPr>
+      </p:pic>
+      <p:pic>
+        <p:nvPicPr>
+          <p:cNvPr id="7" name="Image 6">
+            <a:extLst>
+              <a:ext uri="{FF2B5EF4-FFF2-40B4-BE49-F238E27FC236}">
+                <a16:creationId xmlns:a16="http://schemas.microsoft.com/office/drawing/2014/main" id="{4A66AEB5-0E83-4A13-B351-9B9ED7B4F632}"/>
+              </a:ext>
+            </a:extLst>
+          </p:cNvPr>
+          <p:cNvPicPr>
+            <a:picLocks noChangeAspect="1"/>
+          </p:cNvPicPr>
+          <p:nvPr/>
+        </p:nvPicPr>
+        <p:blipFill>
+          <a:blip r:embed="rId3"/>
+          <a:stretch>
+            <a:fillRect/>
+          </a:stretch>
+        </p:blipFill>
+        <p:spPr>
+          <a:xfrm>
+            <a:off x="767408" y="5243182"/>
+            <a:ext cx="3914996" cy="1264004"/>
           </a:xfrm>
           <a:prstGeom prst="rect">
             <a:avLst/>
@@ -6401,7 +6787,342 @@
 </p:sld>
 </file>
 
-<file path=ppt/slides/slide5.xml><?xml version="1.0" encoding="utf-8"?>
+<file path=ppt/slides/slide6.xml><?xml version="1.0" encoding="utf-8"?>
+<p:sld xmlns:a="http://schemas.openxmlformats.org/drawingml/2006/main" xmlns:r="http://schemas.openxmlformats.org/officeDocument/2006/relationships" xmlns:p="http://schemas.openxmlformats.org/presentationml/2006/main">
+  <p:cSld>
+    <p:spTree>
+      <p:nvGrpSpPr>
+        <p:cNvPr id="1" name=""/>
+        <p:cNvGrpSpPr/>
+        <p:nvPr/>
+      </p:nvGrpSpPr>
+      <p:grpSpPr>
+        <a:xfrm>
+          <a:off x="0" y="0"/>
+          <a:ext cx="0" cy="0"/>
+          <a:chOff x="0" y="0"/>
+          <a:chExt cx="0" cy="0"/>
+        </a:xfrm>
+      </p:grpSpPr>
+      <p:sp>
+        <p:nvSpPr>
+          <p:cNvPr id="2" name="Titre 1">
+            <a:extLst>
+              <a:ext uri="{FF2B5EF4-FFF2-40B4-BE49-F238E27FC236}">
+                <a16:creationId xmlns:a16="http://schemas.microsoft.com/office/drawing/2014/main" id="{3DFF6629-F8E7-431D-9232-1E996F4D9CC7}"/>
+              </a:ext>
+            </a:extLst>
+          </p:cNvPr>
+          <p:cNvSpPr>
+            <a:spLocks noGrp="1"/>
+          </p:cNvSpPr>
+          <p:nvPr>
+            <p:ph type="title"/>
+          </p:nvPr>
+        </p:nvSpPr>
+        <p:spPr/>
+        <p:txBody>
+          <a:bodyPr/>
+          <a:lstStyle/>
+          <a:p>
+            <a:r>
+              <a:rPr lang="fr-FR" dirty="0" err="1"/>
+              <a:t>Asynchronous</a:t>
+            </a:r>
+            <a:r>
+              <a:rPr lang="fr-FR" dirty="0"/>
+              <a:t> </a:t>
+            </a:r>
+            <a:r>
+              <a:rPr lang="fr-FR" dirty="0" err="1"/>
+              <a:t>automaton</a:t>
+            </a:r>
+            <a:endParaRPr lang="fr-FR" dirty="0"/>
+          </a:p>
+        </p:txBody>
+      </p:sp>
+      <p:pic>
+        <p:nvPicPr>
+          <p:cNvPr id="6" name="Image 5">
+            <a:extLst>
+              <a:ext uri="{FF2B5EF4-FFF2-40B4-BE49-F238E27FC236}">
+                <a16:creationId xmlns:a16="http://schemas.microsoft.com/office/drawing/2014/main" id="{33D2F5E6-FB3A-4C41-8403-C3A8A9531815}"/>
+              </a:ext>
+            </a:extLst>
+          </p:cNvPr>
+          <p:cNvPicPr>
+            <a:picLocks noChangeAspect="1"/>
+          </p:cNvPicPr>
+          <p:nvPr/>
+        </p:nvPicPr>
+        <p:blipFill>
+          <a:blip r:embed="rId2"/>
+          <a:stretch>
+            <a:fillRect/>
+          </a:stretch>
+        </p:blipFill>
+        <p:spPr>
+          <a:xfrm>
+            <a:off x="551384" y="2276872"/>
+            <a:ext cx="7000019" cy="3231222"/>
+          </a:xfrm>
+          <a:prstGeom prst="rect">
+            <a:avLst/>
+          </a:prstGeom>
+        </p:spPr>
+      </p:pic>
+      <p:sp>
+        <p:nvSpPr>
+          <p:cNvPr id="7" name="ZoneTexte 6">
+            <a:extLst>
+              <a:ext uri="{FF2B5EF4-FFF2-40B4-BE49-F238E27FC236}">
+                <a16:creationId xmlns:a16="http://schemas.microsoft.com/office/drawing/2014/main" id="{464F6472-7014-457E-BDCD-A2FE1E0E465D}"/>
+              </a:ext>
+            </a:extLst>
+          </p:cNvPr>
+          <p:cNvSpPr txBox="1"/>
+          <p:nvPr/>
+        </p:nvSpPr>
+        <p:spPr>
+          <a:xfrm>
+            <a:off x="9480376" y="2492896"/>
+            <a:ext cx="1654620" cy="2308324"/>
+          </a:xfrm>
+          <a:prstGeom prst="rect">
+            <a:avLst/>
+          </a:prstGeom>
+          <a:noFill/>
+        </p:spPr>
+        <p:txBody>
+          <a:bodyPr wrap="none" rtlCol="0">
+            <a:spAutoFit/>
+          </a:bodyPr>
+          <a:lstStyle/>
+          <a:p>
+            <a:r>
+              <a:rPr lang="fr-FR" dirty="0" err="1"/>
+              <a:t>synchStates</a:t>
+            </a:r>
+            <a:r>
+              <a:rPr lang="fr-FR" dirty="0"/>
+              <a:t> =</a:t>
+            </a:r>
+          </a:p>
+          <a:p>
+            <a:r>
+              <a:rPr lang="fr-FR" dirty="0"/>
+              <a:t>[[0],</a:t>
+            </a:r>
+          </a:p>
+          <a:p>
+            <a:r>
+              <a:rPr lang="fr-FR" dirty="0"/>
+              <a:t>[1,2,4,5,6,9,13],</a:t>
+            </a:r>
+          </a:p>
+          <a:p>
+            <a:r>
+              <a:rPr lang="fr-FR" dirty="0"/>
+              <a:t>[3,2,4,5,6,9,13],</a:t>
+            </a:r>
+          </a:p>
+          <a:p>
+            <a:r>
+              <a:rPr lang="fr-FR" dirty="0"/>
+              <a:t>[7],</a:t>
+            </a:r>
+          </a:p>
+          <a:p>
+            <a:r>
+              <a:rPr lang="fr-FR" dirty="0"/>
+              <a:t>[8,5,6,9,12,13],</a:t>
+            </a:r>
+          </a:p>
+          <a:p>
+            <a:r>
+              <a:rPr lang="fr-FR" dirty="0"/>
+              <a:t>[10],</a:t>
+            </a:r>
+          </a:p>
+          <a:p>
+            <a:r>
+              <a:rPr lang="fr-FR" dirty="0"/>
+              <a:t>[11,5,6,9,12,13]]</a:t>
+            </a:r>
+          </a:p>
+        </p:txBody>
+      </p:sp>
+      <p:cxnSp>
+        <p:nvCxnSpPr>
+          <p:cNvPr id="9" name="Connecteur droit avec flèche 8">
+            <a:extLst>
+              <a:ext uri="{FF2B5EF4-FFF2-40B4-BE49-F238E27FC236}">
+                <a16:creationId xmlns:a16="http://schemas.microsoft.com/office/drawing/2014/main" id="{50EE1A82-1D72-4A6B-932B-E468667022C6}"/>
+              </a:ext>
+            </a:extLst>
+          </p:cNvPr>
+          <p:cNvCxnSpPr>
+            <a:cxnSpLocks/>
+          </p:cNvCxnSpPr>
+          <p:nvPr/>
+        </p:nvCxnSpPr>
+        <p:spPr>
+          <a:xfrm>
+            <a:off x="8616280" y="3573016"/>
+            <a:ext cx="1008112" cy="1008112"/>
+          </a:xfrm>
+          <a:prstGeom prst="straightConnector1">
+            <a:avLst/>
+          </a:prstGeom>
+          <a:ln>
+            <a:tailEnd type="triangle"/>
+          </a:ln>
+        </p:spPr>
+        <p:style>
+          <a:lnRef idx="1">
+            <a:schemeClr val="accent1"/>
+          </a:lnRef>
+          <a:fillRef idx="0">
+            <a:schemeClr val="accent1"/>
+          </a:fillRef>
+          <a:effectRef idx="0">
+            <a:schemeClr val="accent1"/>
+          </a:effectRef>
+          <a:fontRef idx="minor">
+            <a:schemeClr val="tx1"/>
+          </a:fontRef>
+        </p:style>
+      </p:cxnSp>
+      <p:sp>
+        <p:nvSpPr>
+          <p:cNvPr id="10" name="ZoneTexte 9">
+            <a:extLst>
+              <a:ext uri="{FF2B5EF4-FFF2-40B4-BE49-F238E27FC236}">
+                <a16:creationId xmlns:a16="http://schemas.microsoft.com/office/drawing/2014/main" id="{8A4A346E-B43F-40F9-B620-003579311AD3}"/>
+              </a:ext>
+            </a:extLst>
+          </p:cNvPr>
+          <p:cNvSpPr txBox="1"/>
+          <p:nvPr/>
+        </p:nvSpPr>
+        <p:spPr>
+          <a:xfrm>
+            <a:off x="7965690" y="3203684"/>
+            <a:ext cx="1260281" cy="369332"/>
+          </a:xfrm>
+          <a:prstGeom prst="rect">
+            <a:avLst/>
+          </a:prstGeom>
+          <a:noFill/>
+        </p:spPr>
+        <p:txBody>
+          <a:bodyPr wrap="none" rtlCol="0">
+            <a:spAutoFit/>
+          </a:bodyPr>
+          <a:lstStyle/>
+          <a:p>
+            <a:r>
+              <a:rPr lang="fr-FR" dirty="0" err="1"/>
+              <a:t>synchState</a:t>
+            </a:r>
+            <a:endParaRPr lang="fr-FR" dirty="0"/>
+          </a:p>
+        </p:txBody>
+      </p:sp>
+      <p:sp>
+        <p:nvSpPr>
+          <p:cNvPr id="12" name="Accolade fermante 11">
+            <a:extLst>
+              <a:ext uri="{FF2B5EF4-FFF2-40B4-BE49-F238E27FC236}">
+                <a16:creationId xmlns:a16="http://schemas.microsoft.com/office/drawing/2014/main" id="{C09F6EF3-9E35-4600-AEE2-12D2557913C7}"/>
+              </a:ext>
+            </a:extLst>
+          </p:cNvPr>
+          <p:cNvSpPr/>
+          <p:nvPr/>
+        </p:nvSpPr>
+        <p:spPr>
+          <a:xfrm rot="5400000">
+            <a:off x="10193680" y="4467691"/>
+            <a:ext cx="323528" cy="986167"/>
+          </a:xfrm>
+          <a:prstGeom prst="rightBrace">
+            <a:avLst/>
+          </a:prstGeom>
+        </p:spPr>
+        <p:style>
+          <a:lnRef idx="1">
+            <a:schemeClr val="accent1"/>
+          </a:lnRef>
+          <a:fillRef idx="0">
+            <a:schemeClr val="accent1"/>
+          </a:fillRef>
+          <a:effectRef idx="0">
+            <a:schemeClr val="accent1"/>
+          </a:effectRef>
+          <a:fontRef idx="minor">
+            <a:schemeClr val="tx1"/>
+          </a:fontRef>
+        </p:style>
+        <p:txBody>
+          <a:bodyPr rtlCol="0" anchor="ctr"/>
+          <a:lstStyle/>
+          <a:p>
+            <a:pPr algn="ctr"/>
+            <a:endParaRPr lang="fr-FR"/>
+          </a:p>
+        </p:txBody>
+      </p:sp>
+      <p:sp>
+        <p:nvSpPr>
+          <p:cNvPr id="13" name="ZoneTexte 12">
+            <a:extLst>
+              <a:ext uri="{FF2B5EF4-FFF2-40B4-BE49-F238E27FC236}">
+                <a16:creationId xmlns:a16="http://schemas.microsoft.com/office/drawing/2014/main" id="{490CB093-0C5E-4A9C-9CCD-278252350D1F}"/>
+              </a:ext>
+            </a:extLst>
+          </p:cNvPr>
+          <p:cNvSpPr txBox="1"/>
+          <p:nvPr/>
+        </p:nvSpPr>
+        <p:spPr>
+          <a:xfrm>
+            <a:off x="9862361" y="5193724"/>
+            <a:ext cx="986167" cy="369332"/>
+          </a:xfrm>
+          <a:prstGeom prst="rect">
+            <a:avLst/>
+          </a:prstGeom>
+          <a:noFill/>
+        </p:spPr>
+        <p:txBody>
+          <a:bodyPr wrap="none" rtlCol="0">
+            <a:spAutoFit/>
+          </a:bodyPr>
+          <a:lstStyle/>
+          <a:p>
+            <a:r>
+              <a:rPr lang="fr-FR" dirty="0" err="1"/>
+              <a:t>closures</a:t>
+            </a:r>
+            <a:endParaRPr lang="fr-FR" dirty="0"/>
+          </a:p>
+        </p:txBody>
+      </p:sp>
+    </p:spTree>
+    <p:extLst>
+      <p:ext uri="{BB962C8B-B14F-4D97-AF65-F5344CB8AC3E}">
+        <p14:creationId xmlns:p14="http://schemas.microsoft.com/office/powerpoint/2010/main" val="1754050570"/>
+      </p:ext>
+    </p:extLst>
+  </p:cSld>
+  <p:clrMapOvr>
+    <a:masterClrMapping/>
+  </p:clrMapOvr>
+</p:sld>
+</file>
+
+<file path=ppt/slides/slide7.xml><?xml version="1.0" encoding="utf-8"?>
 <p:sld xmlns:a="http://schemas.openxmlformats.org/drawingml/2006/main" xmlns:r="http://schemas.openxmlformats.org/officeDocument/2006/relationships" xmlns:p="http://schemas.openxmlformats.org/presentationml/2006/main">
   <p:cSld>
     <p:spTree>
@@ -6457,19 +7178,19 @@
           <p:nvPr>
             <p:extLst>
               <p:ext uri="{D42A27DB-BD31-4B8C-83A1-F6EECF244321}">
-                <p14:modId xmlns:p14="http://schemas.microsoft.com/office/powerpoint/2010/main" val="1357866860"/>
+                <p14:modId xmlns:p14="http://schemas.microsoft.com/office/powerpoint/2010/main" val="608636446"/>
               </p:ext>
             </p:extLst>
           </p:nvPr>
         </p:nvGraphicFramePr>
         <p:xfrm>
-          <a:off x="7320136" y="3573016"/>
+          <a:off x="9051155" y="4365104"/>
           <a:ext cx="2952327" cy="1851392"/>
         </p:xfrm>
         <a:graphic>
           <a:graphicData uri="http://schemas.openxmlformats.org/drawingml/2006/table">
             <a:tbl>
-              <a:tblPr firstRow="1" bandRow="1">
+              <a:tblPr firstRow="1" firstCol="1" bandRow="1">
                 <a:tableStyleId>{5C22544A-7EE6-4342-B048-85BDC9FD1C3A}</a:tableStyleId>
               </a:tblPr>
               <a:tblGrid>
@@ -6782,10 +7503,10 @@
       </p:graphicFrame>
       <p:pic>
         <p:nvPicPr>
-          <p:cNvPr id="3" name="Image 2">
+          <p:cNvPr id="5" name="Image 4">
             <a:extLst>
               <a:ext uri="{FF2B5EF4-FFF2-40B4-BE49-F238E27FC236}">
-                <a16:creationId xmlns:a16="http://schemas.microsoft.com/office/drawing/2014/main" id="{021B1F1B-3ED9-4FBF-AC4C-0BD834B4AF9C}"/>
+                <a16:creationId xmlns:a16="http://schemas.microsoft.com/office/drawing/2014/main" id="{E2549CAC-31E7-4897-B49C-E6562ED60489}"/>
               </a:ext>
             </a:extLst>
           </p:cNvPr>
@@ -6802,218 +7523,541 @@
         </p:blipFill>
         <p:spPr>
           <a:xfrm>
-            <a:off x="479376" y="2492896"/>
-            <a:ext cx="5285620" cy="3061033"/>
+            <a:off x="407368" y="2060848"/>
+            <a:ext cx="6025387" cy="3816424"/>
           </a:xfrm>
           <a:prstGeom prst="rect">
             <a:avLst/>
           </a:prstGeom>
         </p:spPr>
       </p:pic>
-    </p:spTree>
-    <p:extLst>
-      <p:ext uri="{BB962C8B-B14F-4D97-AF65-F5344CB8AC3E}">
-        <p14:creationId xmlns:p14="http://schemas.microsoft.com/office/powerpoint/2010/main" val="1153027685"/>
-      </p:ext>
-    </p:extLst>
-  </p:cSld>
-  <p:clrMapOvr>
-    <a:masterClrMapping/>
-  </p:clrMapOvr>
-</p:sld>
-</file>
-
-<file path=ppt/slides/slide6.xml><?xml version="1.0" encoding="utf-8"?>
-<p:sld xmlns:a="http://schemas.openxmlformats.org/drawingml/2006/main" xmlns:r="http://schemas.openxmlformats.org/officeDocument/2006/relationships" xmlns:p="http://schemas.openxmlformats.org/presentationml/2006/main">
-  <p:cSld>
-    <p:spTree>
-      <p:nvGrpSpPr>
-        <p:cNvPr id="1" name=""/>
-        <p:cNvGrpSpPr/>
-        <p:nvPr/>
-      </p:nvGrpSpPr>
-      <p:grpSpPr>
-        <a:xfrm>
-          <a:off x="0" y="0"/>
-          <a:ext cx="0" cy="0"/>
-          <a:chOff x="0" y="0"/>
-          <a:chExt cx="0" cy="0"/>
-        </a:xfrm>
-      </p:grpSpPr>
+      <p:pic>
+        <p:nvPicPr>
+          <p:cNvPr id="6" name="Image 5">
+            <a:extLst>
+              <a:ext uri="{FF2B5EF4-FFF2-40B4-BE49-F238E27FC236}">
+                <a16:creationId xmlns:a16="http://schemas.microsoft.com/office/drawing/2014/main" id="{557A8B96-BE41-43FB-915C-E97A999111F1}"/>
+              </a:ext>
+            </a:extLst>
+          </p:cNvPr>
+          <p:cNvPicPr>
+            <a:picLocks noChangeAspect="1"/>
+          </p:cNvPicPr>
+          <p:nvPr/>
+        </p:nvPicPr>
+        <p:blipFill>
+          <a:blip r:embed="rId3"/>
+          <a:stretch>
+            <a:fillRect/>
+          </a:stretch>
+        </p:blipFill>
+        <p:spPr>
+          <a:xfrm>
+            <a:off x="6648533" y="971005"/>
+            <a:ext cx="2136124" cy="4598699"/>
+          </a:xfrm>
+          <a:prstGeom prst="rect">
+            <a:avLst/>
+          </a:prstGeom>
+        </p:spPr>
+      </p:pic>
+      <p:graphicFrame>
+        <p:nvGraphicFramePr>
+          <p:cNvPr id="7" name="Tableau 6">
+            <a:extLst>
+              <a:ext uri="{FF2B5EF4-FFF2-40B4-BE49-F238E27FC236}">
+                <a16:creationId xmlns:a16="http://schemas.microsoft.com/office/drawing/2014/main" id="{F58F79FB-5AC4-4A76-9B9B-EAF982994180}"/>
+              </a:ext>
+            </a:extLst>
+          </p:cNvPr>
+          <p:cNvGraphicFramePr>
+            <a:graphicFrameLocks noGrp="1"/>
+          </p:cNvGraphicFramePr>
+          <p:nvPr>
+            <p:extLst>
+              <p:ext uri="{D42A27DB-BD31-4B8C-83A1-F6EECF244321}">
+                <p14:modId xmlns:p14="http://schemas.microsoft.com/office/powerpoint/2010/main" val="936204760"/>
+              </p:ext>
+            </p:extLst>
+          </p:nvPr>
+        </p:nvGraphicFramePr>
+        <p:xfrm>
+          <a:off x="9051155" y="332656"/>
+          <a:ext cx="2901607" cy="2595880"/>
+        </p:xfrm>
+        <a:graphic>
+          <a:graphicData uri="http://schemas.openxmlformats.org/drawingml/2006/table">
+            <a:tbl>
+              <a:tblPr firstRow="1" firstCol="1" bandRow="1">
+                <a:tableStyleId>{5C22544A-7EE6-4342-B048-85BDC9FD1C3A}</a:tableStyleId>
+              </a:tblPr>
+              <a:tblGrid>
+                <a:gridCol w="981393">
+                  <a:extLst>
+                    <a:ext uri="{9D8B030D-6E8A-4147-A177-3AD203B41FA5}">
+                      <a16:colId xmlns:a16="http://schemas.microsoft.com/office/drawing/2014/main" val="3514960263"/>
+                    </a:ext>
+                  </a:extLst>
+                </a:gridCol>
+                <a:gridCol w="960107">
+                  <a:extLst>
+                    <a:ext uri="{9D8B030D-6E8A-4147-A177-3AD203B41FA5}">
+                      <a16:colId xmlns:a16="http://schemas.microsoft.com/office/drawing/2014/main" val="1223596756"/>
+                    </a:ext>
+                  </a:extLst>
+                </a:gridCol>
+                <a:gridCol w="960107">
+                  <a:extLst>
+                    <a:ext uri="{9D8B030D-6E8A-4147-A177-3AD203B41FA5}">
+                      <a16:colId xmlns:a16="http://schemas.microsoft.com/office/drawing/2014/main" val="3262531055"/>
+                    </a:ext>
+                  </a:extLst>
+                </a:gridCol>
+              </a:tblGrid>
+              <a:tr h="370840">
+                <a:tc>
+                  <a:txBody>
+                    <a:bodyPr/>
+                    <a:lstStyle/>
+                    <a:p>
+                      <a:r>
+                        <a:rPr lang="fr-FR" dirty="0"/>
+                        <a:t>[0]</a:t>
+                      </a:r>
+                    </a:p>
+                  </a:txBody>
+                  <a:tcPr/>
+                </a:tc>
+                <a:tc>
+                  <a:txBody>
+                    <a:bodyPr/>
+                    <a:lstStyle/>
+                    <a:p>
+                      <a:r>
+                        <a:rPr lang="fr-FR" dirty="0"/>
+                        <a:t>[a]</a:t>
+                      </a:r>
+                    </a:p>
+                  </a:txBody>
+                  <a:tcPr/>
+                </a:tc>
+                <a:tc>
+                  <a:txBody>
+                    <a:bodyPr/>
+                    <a:lstStyle/>
+                    <a:p>
+                      <a:r>
+                        <a:rPr lang="fr-FR" dirty="0"/>
+                        <a:t>[b]</a:t>
+                      </a:r>
+                    </a:p>
+                  </a:txBody>
+                  <a:tcPr/>
+                </a:tc>
+                <a:extLst>
+                  <a:ext uri="{0D108BD9-81ED-4DB2-BD59-A6C34878D82A}">
+                    <a16:rowId xmlns:a16="http://schemas.microsoft.com/office/drawing/2014/main" val="105007858"/>
+                  </a:ext>
+                </a:extLst>
+              </a:tr>
+              <a:tr h="370840">
+                <a:tc>
+                  <a:txBody>
+                    <a:bodyPr/>
+                    <a:lstStyle/>
+                    <a:p>
+                      <a:r>
+                        <a:rPr lang="fr-FR" dirty="0"/>
+                        <a:t>[2,0,2]</a:t>
+                      </a:r>
+                    </a:p>
+                  </a:txBody>
+                  <a:tcPr/>
+                </a:tc>
+                <a:tc>
+                  <a:txBody>
+                    <a:bodyPr/>
+                    <a:lstStyle/>
+                    <a:p>
+                      <a:r>
+                        <a:rPr lang="fr-FR" dirty="0"/>
+                        <a:t>[2,0,1]</a:t>
+                      </a:r>
+                    </a:p>
+                  </a:txBody>
+                  <a:tcPr/>
+                </a:tc>
+                <a:tc>
+                  <a:txBody>
+                    <a:bodyPr/>
+                    <a:lstStyle/>
+                    <a:p>
+                      <a:r>
+                        <a:rPr lang="fr-FR" dirty="0"/>
+                        <a:t>[2,1,2]</a:t>
+                      </a:r>
+                    </a:p>
+                  </a:txBody>
+                  <a:tcPr/>
+                </a:tc>
+                <a:extLst>
+                  <a:ext uri="{0D108BD9-81ED-4DB2-BD59-A6C34878D82A}">
+                    <a16:rowId xmlns:a16="http://schemas.microsoft.com/office/drawing/2014/main" val="1638923421"/>
+                  </a:ext>
+                </a:extLst>
+              </a:tr>
+              <a:tr h="370840">
+                <a:tc>
+                  <a:txBody>
+                    <a:bodyPr/>
+                    <a:lstStyle/>
+                    <a:p>
+                      <a:r>
+                        <a:rPr lang="fr-FR" dirty="0"/>
+                        <a:t>[2,0,1]</a:t>
+                      </a:r>
+                    </a:p>
+                  </a:txBody>
+                  <a:tcPr/>
+                </a:tc>
+                <a:tc>
+                  <a:txBody>
+                    <a:bodyPr/>
+                    <a:lstStyle/>
+                    <a:p>
+                      <a:r>
+                        <a:rPr lang="fr-FR" dirty="0"/>
+                        <a:t>[1,1]</a:t>
+                      </a:r>
+                    </a:p>
+                  </a:txBody>
+                  <a:tcPr/>
+                </a:tc>
+                <a:tc>
+                  <a:txBody>
+                    <a:bodyPr/>
+                    <a:lstStyle/>
+                    <a:p>
+                      <a:r>
+                        <a:rPr lang="fr-FR" dirty="0"/>
+                        <a:t>[3,0,1,2]</a:t>
+                      </a:r>
+                    </a:p>
+                  </a:txBody>
+                  <a:tcPr/>
+                </a:tc>
+                <a:extLst>
+                  <a:ext uri="{0D108BD9-81ED-4DB2-BD59-A6C34878D82A}">
+                    <a16:rowId xmlns:a16="http://schemas.microsoft.com/office/drawing/2014/main" val="2112326632"/>
+                  </a:ext>
+                </a:extLst>
+              </a:tr>
+              <a:tr h="370840">
+                <a:tc>
+                  <a:txBody>
+                    <a:bodyPr/>
+                    <a:lstStyle/>
+                    <a:p>
+                      <a:r>
+                        <a:rPr lang="fr-FR" dirty="0"/>
+                        <a:t>[2,1,2]</a:t>
+                      </a:r>
+                    </a:p>
+                  </a:txBody>
+                  <a:tcPr/>
+                </a:tc>
+                <a:tc>
+                  <a:txBody>
+                    <a:bodyPr/>
+                    <a:lstStyle/>
+                    <a:p>
+                      <a:r>
+                        <a:rPr lang="fr-FR" dirty="0"/>
+                        <a:t>[2,0,1]</a:t>
+                      </a:r>
+                    </a:p>
+                  </a:txBody>
+                  <a:tcPr/>
+                </a:tc>
+                <a:tc>
+                  <a:txBody>
+                    <a:bodyPr/>
+                    <a:lstStyle/>
+                    <a:p>
+                      <a:r>
+                        <a:rPr lang="fr-FR" dirty="0"/>
+                        <a:t>[2,0,2]</a:t>
+                      </a:r>
+                    </a:p>
+                  </a:txBody>
+                  <a:tcPr/>
+                </a:tc>
+                <a:extLst>
+                  <a:ext uri="{0D108BD9-81ED-4DB2-BD59-A6C34878D82A}">
+                    <a16:rowId xmlns:a16="http://schemas.microsoft.com/office/drawing/2014/main" val="729924890"/>
+                  </a:ext>
+                </a:extLst>
+              </a:tr>
+              <a:tr h="370840">
+                <a:tc>
+                  <a:txBody>
+                    <a:bodyPr/>
+                    <a:lstStyle/>
+                    <a:p>
+                      <a:r>
+                        <a:rPr lang="fr-FR" dirty="0"/>
+                        <a:t>[1,1]</a:t>
+                      </a:r>
+                    </a:p>
+                  </a:txBody>
+                  <a:tcPr/>
+                </a:tc>
+                <a:tc>
+                  <a:txBody>
+                    <a:bodyPr/>
+                    <a:lstStyle/>
+                    <a:p>
+                      <a:r>
+                        <a:rPr lang="fr-FR" dirty="0"/>
+                        <a:t>[1,-1]</a:t>
+                      </a:r>
+                    </a:p>
+                  </a:txBody>
+                  <a:tcPr/>
+                </a:tc>
+                <a:tc>
+                  <a:txBody>
+                    <a:bodyPr/>
+                    <a:lstStyle/>
+                    <a:p>
+                      <a:r>
+                        <a:rPr lang="fr-FR" dirty="0"/>
+                        <a:t>[2,0,2]</a:t>
+                      </a:r>
+                    </a:p>
+                  </a:txBody>
+                  <a:tcPr/>
+                </a:tc>
+                <a:extLst>
+                  <a:ext uri="{0D108BD9-81ED-4DB2-BD59-A6C34878D82A}">
+                    <a16:rowId xmlns:a16="http://schemas.microsoft.com/office/drawing/2014/main" val="3077984825"/>
+                  </a:ext>
+                </a:extLst>
+              </a:tr>
+              <a:tr h="370840">
+                <a:tc>
+                  <a:txBody>
+                    <a:bodyPr/>
+                    <a:lstStyle/>
+                    <a:p>
+                      <a:r>
+                        <a:rPr lang="fr-FR" dirty="0"/>
+                        <a:t>[3,0,1,2]</a:t>
+                      </a:r>
+                    </a:p>
+                  </a:txBody>
+                  <a:tcPr/>
+                </a:tc>
+                <a:tc>
+                  <a:txBody>
+                    <a:bodyPr/>
+                    <a:lstStyle/>
+                    <a:p>
+                      <a:r>
+                        <a:rPr lang="fr-FR" dirty="0"/>
+                        <a:t>[2,0,1]</a:t>
+                      </a:r>
+                    </a:p>
+                  </a:txBody>
+                  <a:tcPr/>
+                </a:tc>
+                <a:tc>
+                  <a:txBody>
+                    <a:bodyPr/>
+                    <a:lstStyle/>
+                    <a:p>
+                      <a:pPr marL="0" marR="0" lvl="0" indent="0" algn="l" defTabSz="914400" rtl="0" eaLnBrk="1" fontAlgn="auto" latinLnBrk="0" hangingPunct="1">
+                        <a:lnSpc>
+                          <a:spcPct val="100000"/>
+                        </a:lnSpc>
+                        <a:spcBef>
+                          <a:spcPts val="0"/>
+                        </a:spcBef>
+                        <a:spcAft>
+                          <a:spcPts val="0"/>
+                        </a:spcAft>
+                        <a:buClrTx/>
+                        <a:buSzTx/>
+                        <a:buFontTx/>
+                        <a:buNone/>
+                        <a:tabLst/>
+                        <a:defRPr/>
+                      </a:pPr>
+                      <a:r>
+                        <a:rPr lang="fr-FR" dirty="0"/>
+                        <a:t>[3,0,1,2]</a:t>
+                      </a:r>
+                    </a:p>
+                  </a:txBody>
+                  <a:tcPr/>
+                </a:tc>
+                <a:extLst>
+                  <a:ext uri="{0D108BD9-81ED-4DB2-BD59-A6C34878D82A}">
+                    <a16:rowId xmlns:a16="http://schemas.microsoft.com/office/drawing/2014/main" val="3473133727"/>
+                  </a:ext>
+                </a:extLst>
+              </a:tr>
+              <a:tr h="370840">
+                <a:tc>
+                  <a:txBody>
+                    <a:bodyPr/>
+                    <a:lstStyle/>
+                    <a:p>
+                      <a:pPr marL="0" marR="0" lvl="0" indent="0" algn="l" defTabSz="914400" rtl="0" eaLnBrk="1" fontAlgn="auto" latinLnBrk="0" hangingPunct="1">
+                        <a:lnSpc>
+                          <a:spcPct val="100000"/>
+                        </a:lnSpc>
+                        <a:spcBef>
+                          <a:spcPts val="0"/>
+                        </a:spcBef>
+                        <a:spcAft>
+                          <a:spcPts val="0"/>
+                        </a:spcAft>
+                        <a:buClrTx/>
+                        <a:buSzTx/>
+                        <a:buFontTx/>
+                        <a:buNone/>
+                        <a:tabLst/>
+                        <a:defRPr/>
+                      </a:pPr>
+                      <a:r>
+                        <a:rPr lang="fr-FR" dirty="0"/>
+                        <a:t>[1,-1]</a:t>
+                      </a:r>
+                    </a:p>
+                  </a:txBody>
+                  <a:tcPr/>
+                </a:tc>
+                <a:tc>
+                  <a:txBody>
+                    <a:bodyPr/>
+                    <a:lstStyle/>
+                    <a:p>
+                      <a:pPr marL="0" marR="0" lvl="0" indent="0" algn="l" defTabSz="914400" rtl="0" eaLnBrk="1" fontAlgn="auto" latinLnBrk="0" hangingPunct="1">
+                        <a:lnSpc>
+                          <a:spcPct val="100000"/>
+                        </a:lnSpc>
+                        <a:spcBef>
+                          <a:spcPts val="0"/>
+                        </a:spcBef>
+                        <a:spcAft>
+                          <a:spcPts val="0"/>
+                        </a:spcAft>
+                        <a:buClrTx/>
+                        <a:buSzTx/>
+                        <a:buFontTx/>
+                        <a:buNone/>
+                        <a:tabLst/>
+                        <a:defRPr/>
+                      </a:pPr>
+                      <a:r>
+                        <a:rPr lang="fr-FR" dirty="0"/>
+                        <a:t>[1,-1]</a:t>
+                      </a:r>
+                    </a:p>
+                  </a:txBody>
+                  <a:tcPr/>
+                </a:tc>
+                <a:tc>
+                  <a:txBody>
+                    <a:bodyPr/>
+                    <a:lstStyle/>
+                    <a:p>
+                      <a:pPr marL="0" marR="0" lvl="0" indent="0" algn="l" defTabSz="914400" rtl="0" eaLnBrk="1" fontAlgn="auto" latinLnBrk="0" hangingPunct="1">
+                        <a:lnSpc>
+                          <a:spcPct val="100000"/>
+                        </a:lnSpc>
+                        <a:spcBef>
+                          <a:spcPts val="0"/>
+                        </a:spcBef>
+                        <a:spcAft>
+                          <a:spcPts val="0"/>
+                        </a:spcAft>
+                        <a:buClrTx/>
+                        <a:buSzTx/>
+                        <a:buFontTx/>
+                        <a:buNone/>
+                        <a:tabLst/>
+                        <a:defRPr/>
+                      </a:pPr>
+                      <a:r>
+                        <a:rPr lang="fr-FR" dirty="0"/>
+                        <a:t>[1,-1]</a:t>
+                      </a:r>
+                    </a:p>
+                  </a:txBody>
+                  <a:tcPr/>
+                </a:tc>
+                <a:extLst>
+                  <a:ext uri="{0D108BD9-81ED-4DB2-BD59-A6C34878D82A}">
+                    <a16:rowId xmlns:a16="http://schemas.microsoft.com/office/drawing/2014/main" val="4287525256"/>
+                  </a:ext>
+                </a:extLst>
+              </a:tr>
+            </a:tbl>
+          </a:graphicData>
+        </a:graphic>
+      </p:graphicFrame>
       <p:sp>
         <p:nvSpPr>
-          <p:cNvPr id="2" name="Titre 1"/>
-          <p:cNvSpPr>
-            <a:spLocks noGrp="1"/>
-          </p:cNvSpPr>
-          <p:nvPr>
-            <p:ph type="title"/>
-          </p:nvPr>
+          <p:cNvPr id="8" name="Flèche : bas 7">
+            <a:extLst>
+              <a:ext uri="{FF2B5EF4-FFF2-40B4-BE49-F238E27FC236}">
+                <a16:creationId xmlns:a16="http://schemas.microsoft.com/office/drawing/2014/main" id="{0B052D49-F934-4506-B34C-0DB020D92129}"/>
+              </a:ext>
+            </a:extLst>
+          </p:cNvPr>
+          <p:cNvSpPr/>
+          <p:nvPr/>
         </p:nvSpPr>
-        <p:spPr/>
+        <p:spPr>
+          <a:xfrm>
+            <a:off x="10141918" y="3270354"/>
+            <a:ext cx="720080" cy="878726"/>
+          </a:xfrm>
+          <a:prstGeom prst="downArrow">
+            <a:avLst/>
+          </a:prstGeom>
+        </p:spPr>
+        <p:style>
+          <a:lnRef idx="2">
+            <a:schemeClr val="accent1">
+              <a:shade val="50000"/>
+            </a:schemeClr>
+          </a:lnRef>
+          <a:fillRef idx="1">
+            <a:schemeClr val="accent1"/>
+          </a:fillRef>
+          <a:effectRef idx="0">
+            <a:schemeClr val="accent1"/>
+          </a:effectRef>
+          <a:fontRef idx="minor">
+            <a:schemeClr val="lt1"/>
+          </a:fontRef>
+        </p:style>
         <p:txBody>
-          <a:bodyPr rtlCol="0"/>
+          <a:bodyPr rtlCol="0" anchor="ctr"/>
           <a:lstStyle/>
           <a:p>
-            <a:pPr rtl="0"/>
-            <a:endParaRPr lang="fr-FR" dirty="0"/>
-          </a:p>
-        </p:txBody>
-      </p:sp>
-      <p:sp>
-        <p:nvSpPr>
-          <p:cNvPr id="3" name="Espace réservé du texte 2"/>
-          <p:cNvSpPr>
-            <a:spLocks noGrp="1"/>
-          </p:cNvSpPr>
-          <p:nvPr>
-            <p:ph type="body" idx="1"/>
-          </p:nvPr>
-        </p:nvSpPr>
-        <p:spPr/>
-        <p:txBody>
-          <a:bodyPr rtlCol="0"/>
-          <a:lstStyle/>
-          <a:p>
-            <a:pPr rtl="0"/>
-            <a:endParaRPr lang="fr-FR" dirty="0"/>
+            <a:pPr algn="ctr"/>
+            <a:endParaRPr lang="fr-FR"/>
           </a:p>
         </p:txBody>
       </p:sp>
     </p:spTree>
     <p:extLst>
       <p:ext uri="{BB962C8B-B14F-4D97-AF65-F5344CB8AC3E}">
-        <p14:creationId xmlns:p14="http://schemas.microsoft.com/office/powerpoint/2010/main" val="3444435236"/>
-      </p:ext>
-    </p:extLst>
-  </p:cSld>
-  <p:clrMapOvr>
-    <a:masterClrMapping/>
-  </p:clrMapOvr>
-</p:sld>
-</file>
-
-<file path=ppt/slides/slide7.xml><?xml version="1.0" encoding="utf-8"?>
-<p:sld xmlns:a="http://schemas.openxmlformats.org/drawingml/2006/main" xmlns:r="http://schemas.openxmlformats.org/officeDocument/2006/relationships" xmlns:p="http://schemas.openxmlformats.org/presentationml/2006/main">
-  <p:cSld>
-    <p:spTree>
-      <p:nvGrpSpPr>
-        <p:cNvPr id="1" name=""/>
-        <p:cNvGrpSpPr/>
-        <p:nvPr/>
-      </p:nvGrpSpPr>
-      <p:grpSpPr>
-        <a:xfrm>
-          <a:off x="0" y="0"/>
-          <a:ext cx="0" cy="0"/>
-          <a:chOff x="0" y="0"/>
-          <a:chExt cx="0" cy="0"/>
-        </a:xfrm>
-      </p:grpSpPr>
-      <p:sp>
-        <p:nvSpPr>
-          <p:cNvPr id="2" name="Titre 1"/>
-          <p:cNvSpPr>
-            <a:spLocks noGrp="1"/>
-          </p:cNvSpPr>
-          <p:nvPr>
-            <p:ph type="title"/>
-          </p:nvPr>
-        </p:nvSpPr>
-        <p:spPr/>
-        <p:txBody>
-          <a:bodyPr rtlCol="0"/>
-          <a:lstStyle/>
-          <a:p>
-            <a:pPr rtl="0"/>
-            <a:endParaRPr lang="fr-FR" dirty="0"/>
-          </a:p>
-        </p:txBody>
-      </p:sp>
-      <p:sp>
-        <p:nvSpPr>
-          <p:cNvPr id="3" name="Espace réservé du texte 2"/>
-          <p:cNvSpPr>
-            <a:spLocks noGrp="1"/>
-          </p:cNvSpPr>
-          <p:nvPr>
-            <p:ph type="body" idx="1"/>
-          </p:nvPr>
-        </p:nvSpPr>
-        <p:spPr/>
-        <p:txBody>
-          <a:bodyPr rtlCol="0"/>
-          <a:lstStyle/>
-          <a:p>
-            <a:pPr rtl="0"/>
-            <a:endParaRPr lang="fr-FR" dirty="0"/>
-          </a:p>
-        </p:txBody>
-      </p:sp>
-      <p:sp>
-        <p:nvSpPr>
-          <p:cNvPr id="4" name="Espace réservé du contenu 3"/>
-          <p:cNvSpPr>
-            <a:spLocks noGrp="1"/>
-          </p:cNvSpPr>
-          <p:nvPr>
-            <p:ph sz="half" idx="2"/>
-          </p:nvPr>
-        </p:nvSpPr>
-        <p:spPr/>
-        <p:txBody>
-          <a:bodyPr rtlCol="0"/>
-          <a:lstStyle/>
-          <a:p>
-            <a:pPr rtl="0"/>
-            <a:endParaRPr lang="fr-FR" dirty="0"/>
-          </a:p>
-        </p:txBody>
-      </p:sp>
-      <p:sp>
-        <p:nvSpPr>
-          <p:cNvPr id="5" name="Espace réservé du texte 4"/>
-          <p:cNvSpPr>
-            <a:spLocks noGrp="1"/>
-          </p:cNvSpPr>
-          <p:nvPr>
-            <p:ph type="body" sz="quarter" idx="3"/>
-          </p:nvPr>
-        </p:nvSpPr>
-        <p:spPr/>
-        <p:txBody>
-          <a:bodyPr rtlCol="0"/>
-          <a:lstStyle/>
-          <a:p>
-            <a:pPr rtl="0"/>
-            <a:endParaRPr lang="fr-FR" dirty="0"/>
-          </a:p>
-        </p:txBody>
-      </p:sp>
-      <p:sp>
-        <p:nvSpPr>
-          <p:cNvPr id="6" name="Espace réservé du contenu 5"/>
-          <p:cNvSpPr>
-            <a:spLocks noGrp="1"/>
-          </p:cNvSpPr>
-          <p:nvPr>
-            <p:ph sz="quarter" idx="4"/>
-          </p:nvPr>
-        </p:nvSpPr>
-        <p:spPr/>
-        <p:txBody>
-          <a:bodyPr rtlCol="0"/>
-          <a:lstStyle/>
-          <a:p>
-            <a:pPr rtl="0"/>
-            <a:endParaRPr lang="fr-FR" dirty="0"/>
-          </a:p>
-        </p:txBody>
-      </p:sp>
-    </p:spTree>
-    <p:extLst>
-      <p:ext uri="{BB962C8B-B14F-4D97-AF65-F5344CB8AC3E}">
-        <p14:creationId xmlns:p14="http://schemas.microsoft.com/office/powerpoint/2010/main" val="1475842300"/>
+        <p14:creationId xmlns:p14="http://schemas.microsoft.com/office/powerpoint/2010/main" val="1153027685"/>
       </p:ext>
     </p:extLst>
   </p:cSld>
@@ -7042,7 +8086,13 @@
       </p:grpSpPr>
       <p:sp>
         <p:nvSpPr>
-          <p:cNvPr id="2" name="Titre 1"/>
+          <p:cNvPr id="2" name="Titre 1">
+            <a:extLst>
+              <a:ext uri="{FF2B5EF4-FFF2-40B4-BE49-F238E27FC236}">
+                <a16:creationId xmlns:a16="http://schemas.microsoft.com/office/drawing/2014/main" id="{E28BBCD0-CB00-488D-A67F-BBA92B74F225}"/>
+              </a:ext>
+            </a:extLst>
+          </p:cNvPr>
           <p:cNvSpPr>
             <a:spLocks noGrp="1"/>
           </p:cNvSpPr>
@@ -7052,108 +8102,138 @@
         </p:nvSpPr>
         <p:spPr/>
         <p:txBody>
-          <a:bodyPr rtlCol="0"/>
+          <a:bodyPr/>
           <a:lstStyle/>
           <a:p>
-            <a:pPr rtl="0"/>
-            <a:endParaRPr lang="fr-FR" dirty="0"/>
+            <a:r>
+              <a:rPr lang="fr-FR" dirty="0" err="1"/>
+              <a:t>Complementary</a:t>
+            </a:r>
+            <a:r>
+              <a:rPr lang="fr-FR" dirty="0"/>
+              <a:t> </a:t>
+            </a:r>
+            <a:r>
+              <a:rPr lang="fr-FR" dirty="0" err="1"/>
+              <a:t>language</a:t>
+            </a:r>
+            <a:r>
+              <a:rPr lang="fr-FR" dirty="0"/>
+              <a:t>, </a:t>
+            </a:r>
+            <a:r>
+              <a:rPr lang="fr-FR" dirty="0" err="1"/>
+              <a:t>standardization</a:t>
+            </a:r>
+            <a:r>
+              <a:rPr lang="fr-FR" dirty="0"/>
+              <a:t> and </a:t>
+            </a:r>
+            <a:r>
+              <a:rPr lang="fr-FR" dirty="0" err="1"/>
+              <a:t>word</a:t>
+            </a:r>
+            <a:r>
+              <a:rPr lang="fr-FR" dirty="0"/>
+              <a:t> recognition</a:t>
+            </a:r>
           </a:p>
         </p:txBody>
       </p:sp>
+      <p:pic>
+        <p:nvPicPr>
+          <p:cNvPr id="5" name="Image 4">
+            <a:extLst>
+              <a:ext uri="{FF2B5EF4-FFF2-40B4-BE49-F238E27FC236}">
+                <a16:creationId xmlns:a16="http://schemas.microsoft.com/office/drawing/2014/main" id="{E59408CF-4EBA-4961-9975-58BB54956302}"/>
+              </a:ext>
+            </a:extLst>
+          </p:cNvPr>
+          <p:cNvPicPr>
+            <a:picLocks noChangeAspect="1"/>
+          </p:cNvPicPr>
+          <p:nvPr/>
+        </p:nvPicPr>
+        <p:blipFill>
+          <a:blip r:embed="rId2"/>
+          <a:stretch>
+            <a:fillRect/>
+          </a:stretch>
+        </p:blipFill>
+        <p:spPr>
+          <a:xfrm>
+            <a:off x="623392" y="2175398"/>
+            <a:ext cx="3753374" cy="1790950"/>
+          </a:xfrm>
+          <a:prstGeom prst="rect">
+            <a:avLst/>
+          </a:prstGeom>
+        </p:spPr>
+      </p:pic>
+      <p:pic>
+        <p:nvPicPr>
+          <p:cNvPr id="6" name="Image 5">
+            <a:extLst>
+              <a:ext uri="{FF2B5EF4-FFF2-40B4-BE49-F238E27FC236}">
+                <a16:creationId xmlns:a16="http://schemas.microsoft.com/office/drawing/2014/main" id="{21DE1875-22A1-479F-AB52-15740F2BF04F}"/>
+              </a:ext>
+            </a:extLst>
+          </p:cNvPr>
+          <p:cNvPicPr>
+            <a:picLocks noChangeAspect="1"/>
+          </p:cNvPicPr>
+          <p:nvPr/>
+        </p:nvPicPr>
+        <p:blipFill>
+          <a:blip r:embed="rId3"/>
+          <a:stretch>
+            <a:fillRect/>
+          </a:stretch>
+        </p:blipFill>
+        <p:spPr>
+          <a:xfrm>
+            <a:off x="5087888" y="2107237"/>
+            <a:ext cx="6552728" cy="1927273"/>
+          </a:xfrm>
+          <a:prstGeom prst="rect">
+            <a:avLst/>
+          </a:prstGeom>
+        </p:spPr>
+      </p:pic>
+      <p:pic>
+        <p:nvPicPr>
+          <p:cNvPr id="7" name="Image 6">
+            <a:extLst>
+              <a:ext uri="{FF2B5EF4-FFF2-40B4-BE49-F238E27FC236}">
+                <a16:creationId xmlns:a16="http://schemas.microsoft.com/office/drawing/2014/main" id="{818EC6C4-9C97-4574-A93F-9E2C517922B8}"/>
+              </a:ext>
+            </a:extLst>
+          </p:cNvPr>
+          <p:cNvPicPr>
+            <a:picLocks noChangeAspect="1"/>
+          </p:cNvPicPr>
+          <p:nvPr/>
+        </p:nvPicPr>
+        <p:blipFill>
+          <a:blip r:embed="rId4"/>
+          <a:stretch>
+            <a:fillRect/>
+          </a:stretch>
+        </p:blipFill>
+        <p:spPr>
+          <a:xfrm>
+            <a:off x="3215680" y="4541547"/>
+            <a:ext cx="4795110" cy="2066482"/>
+          </a:xfrm>
+          <a:prstGeom prst="rect">
+            <a:avLst/>
+          </a:prstGeom>
+        </p:spPr>
+      </p:pic>
     </p:spTree>
     <p:extLst>
       <p:ext uri="{BB962C8B-B14F-4D97-AF65-F5344CB8AC3E}">
-        <p14:creationId xmlns:p14="http://schemas.microsoft.com/office/powerpoint/2010/main" val="215988672"/>
-      </p:ext>
-    </p:extLst>
-  </p:cSld>
-  <p:clrMapOvr>
-    <a:masterClrMapping/>
-  </p:clrMapOvr>
-</p:sld>
-</file>
-
-<file path=ppt/slides/slide9.xml><?xml version="1.0" encoding="utf-8"?>
-<p:sld xmlns:a="http://schemas.openxmlformats.org/drawingml/2006/main" xmlns:r="http://schemas.openxmlformats.org/officeDocument/2006/relationships" xmlns:p="http://schemas.openxmlformats.org/presentationml/2006/main">
-  <p:cSld>
-    <p:spTree>
-      <p:nvGrpSpPr>
-        <p:cNvPr id="1" name=""/>
-        <p:cNvGrpSpPr/>
-        <p:nvPr/>
-      </p:nvGrpSpPr>
-      <p:grpSpPr>
-        <a:xfrm>
-          <a:off x="0" y="0"/>
-          <a:ext cx="0" cy="0"/>
-          <a:chOff x="0" y="0"/>
-          <a:chExt cx="0" cy="0"/>
-        </a:xfrm>
-      </p:grpSpPr>
-      <p:sp>
-        <p:nvSpPr>
-          <p:cNvPr id="2" name="Titre 1"/>
-          <p:cNvSpPr>
-            <a:spLocks noGrp="1"/>
-          </p:cNvSpPr>
-          <p:nvPr>
-            <p:ph type="title"/>
-          </p:nvPr>
-        </p:nvSpPr>
-        <p:spPr/>
-        <p:txBody>
-          <a:bodyPr rtlCol="0"/>
-          <a:lstStyle/>
-          <a:p>
-            <a:pPr rtl="0"/>
-            <a:endParaRPr lang="fr-FR" dirty="0"/>
-          </a:p>
-        </p:txBody>
-      </p:sp>
-      <p:sp>
-        <p:nvSpPr>
-          <p:cNvPr id="3" name="Espace réservé du contenu 2"/>
-          <p:cNvSpPr>
-            <a:spLocks noGrp="1"/>
-          </p:cNvSpPr>
-          <p:nvPr>
-            <p:ph idx="1"/>
-          </p:nvPr>
-        </p:nvSpPr>
-        <p:spPr/>
-        <p:txBody>
-          <a:bodyPr rtlCol="0"/>
-          <a:lstStyle/>
-          <a:p>
-            <a:pPr rtl="0"/>
-            <a:endParaRPr lang="fr-FR" dirty="0"/>
-          </a:p>
-        </p:txBody>
-      </p:sp>
-      <p:sp>
-        <p:nvSpPr>
-          <p:cNvPr id="4" name="Espace réservé du texte 3"/>
-          <p:cNvSpPr>
-            <a:spLocks noGrp="1"/>
-          </p:cNvSpPr>
-          <p:nvPr>
-            <p:ph type="body" sz="half" idx="2"/>
-          </p:nvPr>
-        </p:nvSpPr>
-        <p:spPr/>
-        <p:txBody>
-          <a:bodyPr rtlCol="0"/>
-          <a:lstStyle/>
-          <a:p>
-            <a:pPr rtl="0"/>
-            <a:endParaRPr lang="fr-FR" dirty="0"/>
-          </a:p>
-        </p:txBody>
-      </p:sp>
-    </p:spTree>
-    <p:extLst>
-      <p:ext uri="{BB962C8B-B14F-4D97-AF65-F5344CB8AC3E}">
-        <p14:creationId xmlns:p14="http://schemas.microsoft.com/office/powerpoint/2010/main" val="3232560146"/>
+        <p14:creationId xmlns:p14="http://schemas.microsoft.com/office/powerpoint/2010/main" val="1487969470"/>
       </p:ext>
     </p:extLst>
   </p:cSld>

</xml_diff>